<commit_message>
Illustration for camera rotation changed
</commit_message>
<xml_diff>
--- a/Documentation/Illustrations/Illustrations_EN.pptx
+++ b/Documentation/Illustrations/Illustrations_EN.pptx
@@ -5,19 +5,20 @@
     <p:sldMasterId id="2147483648" r:id="rId1"/>
   </p:sldMasterIdLst>
   <p:notesMasterIdLst>
-    <p:notesMasterId r:id="rId12"/>
+    <p:notesMasterId r:id="rId13"/>
   </p:notesMasterIdLst>
   <p:sldIdLst>
     <p:sldId id="258" r:id="rId2"/>
     <p:sldId id="265" r:id="rId3"/>
     <p:sldId id="266" r:id="rId4"/>
-    <p:sldId id="259" r:id="rId5"/>
-    <p:sldId id="260" r:id="rId6"/>
-    <p:sldId id="256" r:id="rId7"/>
-    <p:sldId id="257" r:id="rId8"/>
-    <p:sldId id="261" r:id="rId9"/>
-    <p:sldId id="263" r:id="rId10"/>
-    <p:sldId id="264" r:id="rId11"/>
+    <p:sldId id="267" r:id="rId5"/>
+    <p:sldId id="259" r:id="rId6"/>
+    <p:sldId id="260" r:id="rId7"/>
+    <p:sldId id="256" r:id="rId8"/>
+    <p:sldId id="257" r:id="rId9"/>
+    <p:sldId id="261" r:id="rId10"/>
+    <p:sldId id="263" r:id="rId11"/>
+    <p:sldId id="264" r:id="rId12"/>
   </p:sldIdLst>
   <p:sldSz cx="9144000" cy="6858000" type="screen4x3"/>
   <p:notesSz cx="6858000" cy="9144000"/>
@@ -201,7 +202,7 @@
           <a:p>
             <a:fld id="{50BD0A93-9162-415E-AC6A-4AE425667DE1}" type="datetimeFigureOut">
               <a:rPr lang="de-DE" smtClean="0"/>
-              <a:t>27.03.2018</a:t>
+              <a:t>31.05.2018</a:t>
             </a:fld>
             <a:endParaRPr lang="de-DE"/>
           </a:p>
@@ -534,7 +535,7 @@
           <a:p>
             <a:fld id="{5E42C48A-DE1A-49F6-8249-355F1A8F7975}" type="slidenum">
               <a:rPr lang="de-DE" smtClean="0"/>
-              <a:t>10</a:t>
+              <a:t>11</a:t>
             </a:fld>
             <a:endParaRPr lang="de-DE"/>
           </a:p>
@@ -734,7 +735,7 @@
           <a:p>
             <a:fld id="{E55B330B-0DC0-4CD1-AD29-A7230E8C35FA}" type="datetimeFigureOut">
               <a:rPr lang="de-DE" smtClean="0"/>
-              <a:t>27.03.2018</a:t>
+              <a:t>31.05.2018</a:t>
             </a:fld>
             <a:endParaRPr lang="de-DE"/>
           </a:p>
@@ -904,7 +905,7 @@
           <a:p>
             <a:fld id="{E55B330B-0DC0-4CD1-AD29-A7230E8C35FA}" type="datetimeFigureOut">
               <a:rPr lang="de-DE" smtClean="0"/>
-              <a:t>27.03.2018</a:t>
+              <a:t>31.05.2018</a:t>
             </a:fld>
             <a:endParaRPr lang="de-DE"/>
           </a:p>
@@ -1084,7 +1085,7 @@
           <a:p>
             <a:fld id="{E55B330B-0DC0-4CD1-AD29-A7230E8C35FA}" type="datetimeFigureOut">
               <a:rPr lang="de-DE" smtClean="0"/>
-              <a:t>27.03.2018</a:t>
+              <a:t>31.05.2018</a:t>
             </a:fld>
             <a:endParaRPr lang="de-DE"/>
           </a:p>
@@ -1254,7 +1255,7 @@
           <a:p>
             <a:fld id="{E55B330B-0DC0-4CD1-AD29-A7230E8C35FA}" type="datetimeFigureOut">
               <a:rPr lang="de-DE" smtClean="0"/>
-              <a:t>27.03.2018</a:t>
+              <a:t>31.05.2018</a:t>
             </a:fld>
             <a:endParaRPr lang="de-DE"/>
           </a:p>
@@ -1500,7 +1501,7 @@
           <a:p>
             <a:fld id="{E55B330B-0DC0-4CD1-AD29-A7230E8C35FA}" type="datetimeFigureOut">
               <a:rPr lang="de-DE" smtClean="0"/>
-              <a:t>27.03.2018</a:t>
+              <a:t>31.05.2018</a:t>
             </a:fld>
             <a:endParaRPr lang="de-DE"/>
           </a:p>
@@ -1788,7 +1789,7 @@
           <a:p>
             <a:fld id="{E55B330B-0DC0-4CD1-AD29-A7230E8C35FA}" type="datetimeFigureOut">
               <a:rPr lang="de-DE" smtClean="0"/>
-              <a:t>27.03.2018</a:t>
+              <a:t>31.05.2018</a:t>
             </a:fld>
             <a:endParaRPr lang="de-DE"/>
           </a:p>
@@ -2210,7 +2211,7 @@
           <a:p>
             <a:fld id="{E55B330B-0DC0-4CD1-AD29-A7230E8C35FA}" type="datetimeFigureOut">
               <a:rPr lang="de-DE" smtClean="0"/>
-              <a:t>27.03.2018</a:t>
+              <a:t>31.05.2018</a:t>
             </a:fld>
             <a:endParaRPr lang="de-DE"/>
           </a:p>
@@ -2328,7 +2329,7 @@
           <a:p>
             <a:fld id="{E55B330B-0DC0-4CD1-AD29-A7230E8C35FA}" type="datetimeFigureOut">
               <a:rPr lang="de-DE" smtClean="0"/>
-              <a:t>27.03.2018</a:t>
+              <a:t>31.05.2018</a:t>
             </a:fld>
             <a:endParaRPr lang="de-DE"/>
           </a:p>
@@ -2423,7 +2424,7 @@
           <a:p>
             <a:fld id="{E55B330B-0DC0-4CD1-AD29-A7230E8C35FA}" type="datetimeFigureOut">
               <a:rPr lang="de-DE" smtClean="0"/>
-              <a:t>27.03.2018</a:t>
+              <a:t>31.05.2018</a:t>
             </a:fld>
             <a:endParaRPr lang="de-DE"/>
           </a:p>
@@ -2700,7 +2701,7 @@
           <a:p>
             <a:fld id="{E55B330B-0DC0-4CD1-AD29-A7230E8C35FA}" type="datetimeFigureOut">
               <a:rPr lang="de-DE" smtClean="0"/>
-              <a:t>27.03.2018</a:t>
+              <a:t>31.05.2018</a:t>
             </a:fld>
             <a:endParaRPr lang="de-DE"/>
           </a:p>
@@ -2953,7 +2954,7 @@
           <a:p>
             <a:fld id="{E55B330B-0DC0-4CD1-AD29-A7230E8C35FA}" type="datetimeFigureOut">
               <a:rPr lang="de-DE" smtClean="0"/>
-              <a:t>27.03.2018</a:t>
+              <a:t>31.05.2018</a:t>
             </a:fld>
             <a:endParaRPr lang="de-DE"/>
           </a:p>
@@ -3166,7 +3167,7 @@
           <a:p>
             <a:fld id="{E55B330B-0DC0-4CD1-AD29-A7230E8C35FA}" type="datetimeFigureOut">
               <a:rPr lang="de-DE" smtClean="0"/>
-              <a:t>27.03.2018</a:t>
+              <a:t>31.05.2018</a:t>
             </a:fld>
             <a:endParaRPr lang="de-DE"/>
           </a:p>
@@ -4274,6 +4275,819 @@
       </p:grpSpPr>
       <p:pic>
         <p:nvPicPr>
+          <p:cNvPr id="2" name="Grafik 1"/>
+          <p:cNvPicPr>
+            <a:picLocks noChangeAspect="1"/>
+          </p:cNvPicPr>
+          <p:nvPr/>
+        </p:nvPicPr>
+        <p:blipFill>
+          <a:blip r:embed="rId2">
+            <a:extLst>
+              <a:ext uri="{28A0092B-C50C-407E-A947-70E740481C1C}">
+                <a14:useLocalDpi xmlns:a14="http://schemas.microsoft.com/office/drawing/2010/main" val="0"/>
+              </a:ext>
+            </a:extLst>
+          </a:blip>
+          <a:stretch>
+            <a:fillRect/>
+          </a:stretch>
+        </p:blipFill>
+        <p:spPr>
+          <a:xfrm>
+            <a:off x="755576" y="564956"/>
+            <a:ext cx="7750492" cy="5816372"/>
+          </a:xfrm>
+          <a:prstGeom prst="rect">
+            <a:avLst/>
+          </a:prstGeom>
+        </p:spPr>
+      </p:pic>
+      <p:grpSp>
+        <p:nvGrpSpPr>
+          <p:cNvPr id="25" name="Gruppieren 24"/>
+          <p:cNvGrpSpPr/>
+          <p:nvPr/>
+        </p:nvGrpSpPr>
+        <p:grpSpPr>
+          <a:xfrm>
+            <a:off x="1478105" y="4776419"/>
+            <a:ext cx="900887" cy="628172"/>
+            <a:chOff x="1478105" y="4776419"/>
+            <a:chExt cx="900887" cy="628172"/>
+          </a:xfrm>
+        </p:grpSpPr>
+        <p:sp>
+          <p:nvSpPr>
+            <p:cNvPr id="5" name="Multiplizieren 4"/>
+            <p:cNvSpPr/>
+            <p:nvPr/>
+          </p:nvSpPr>
+          <p:spPr>
+            <a:xfrm>
+              <a:off x="1686958" y="4776419"/>
+              <a:ext cx="399281" cy="382781"/>
+            </a:xfrm>
+            <a:prstGeom prst="mathMultiply">
+              <a:avLst>
+                <a:gd name="adj1" fmla="val 0"/>
+              </a:avLst>
+            </a:prstGeom>
+            <a:solidFill>
+              <a:srgbClr val="FFFF00"/>
+            </a:solidFill>
+            <a:ln>
+              <a:solidFill>
+                <a:srgbClr val="FFFF00"/>
+              </a:solidFill>
+            </a:ln>
+          </p:spPr>
+          <p:style>
+            <a:lnRef idx="2">
+              <a:schemeClr val="accent1">
+                <a:shade val="50000"/>
+              </a:schemeClr>
+            </a:lnRef>
+            <a:fillRef idx="1">
+              <a:schemeClr val="accent1"/>
+            </a:fillRef>
+            <a:effectRef idx="0">
+              <a:schemeClr val="accent1"/>
+            </a:effectRef>
+            <a:fontRef idx="minor">
+              <a:schemeClr val="lt1"/>
+            </a:fontRef>
+          </p:style>
+          <p:txBody>
+            <a:bodyPr rtlCol="0" anchor="ctr"/>
+            <a:lstStyle/>
+            <a:p>
+              <a:pPr algn="ctr"/>
+              <a:endParaRPr lang="de-DE"/>
+            </a:p>
+          </p:txBody>
+        </p:sp>
+        <mc:AlternateContent xmlns:mc="http://schemas.openxmlformats.org/markup-compatibility/2006" xmlns:a14="http://schemas.microsoft.com/office/drawing/2010/main">
+          <mc:Choice Requires="a14">
+            <p:sp>
+              <p:nvSpPr>
+                <p:cNvPr id="6" name="Rechteck 5"/>
+                <p:cNvSpPr/>
+                <p:nvPr/>
+              </p:nvSpPr>
+              <p:spPr>
+                <a:xfrm>
+                  <a:off x="1478105" y="5035259"/>
+                  <a:ext cx="900887" cy="369332"/>
+                </a:xfrm>
+                <a:prstGeom prst="rect">
+                  <a:avLst/>
+                </a:prstGeom>
+              </p:spPr>
+              <p:txBody>
+                <a:bodyPr wrap="square">
+                  <a:spAutoFit/>
+                </a:bodyPr>
+                <a:lstStyle/>
+                <a:p>
+                  <a:pPr/>
+                  <a14:m>
+                    <m:oMathPara xmlns:m="http://schemas.openxmlformats.org/officeDocument/2006/math">
+                      <m:oMathParaPr>
+                        <m:jc m:val="centerGroup"/>
+                      </m:oMathParaPr>
+                      <m:oMath xmlns:m="http://schemas.openxmlformats.org/officeDocument/2006/math">
+                        <m:r>
+                          <a:rPr lang="de-DE" i="1" smtClean="0">
+                            <a:solidFill>
+                              <a:schemeClr val="bg1"/>
+                            </a:solidFill>
+                            <a:latin typeface="Cambria Math"/>
+                          </a:rPr>
+                          <m:t>(</m:t>
+                        </m:r>
+                        <m:sSub>
+                          <m:sSubPr>
+                            <m:ctrlPr>
+                              <a:rPr lang="de-DE" i="1">
+                                <a:solidFill>
+                                  <a:schemeClr val="bg1"/>
+                                </a:solidFill>
+                                <a:latin typeface="Cambria Math"/>
+                              </a:rPr>
+                            </m:ctrlPr>
+                          </m:sSubPr>
+                          <m:e>
+                            <m:r>
+                              <a:rPr lang="de-DE" i="1">
+                                <a:solidFill>
+                                  <a:schemeClr val="bg1"/>
+                                </a:solidFill>
+                                <a:latin typeface="Cambria Math"/>
+                              </a:rPr>
+                              <m:t>𝑥</m:t>
+                            </m:r>
+                          </m:e>
+                          <m:sub>
+                            <m:r>
+                              <a:rPr lang="de-DE" i="1">
+                                <a:solidFill>
+                                  <a:schemeClr val="bg1"/>
+                                </a:solidFill>
+                                <a:latin typeface="Cambria Math"/>
+                              </a:rPr>
+                              <m:t>1</m:t>
+                            </m:r>
+                          </m:sub>
+                        </m:sSub>
+                        <m:r>
+                          <a:rPr lang="de-DE" i="1">
+                            <a:solidFill>
+                              <a:schemeClr val="bg1"/>
+                            </a:solidFill>
+                            <a:latin typeface="Cambria Math"/>
+                          </a:rPr>
+                          <m:t>, </m:t>
+                        </m:r>
+                        <m:sSub>
+                          <m:sSubPr>
+                            <m:ctrlPr>
+                              <a:rPr lang="de-DE" i="1">
+                                <a:solidFill>
+                                  <a:schemeClr val="bg1"/>
+                                </a:solidFill>
+                                <a:latin typeface="Cambria Math"/>
+                              </a:rPr>
+                            </m:ctrlPr>
+                          </m:sSubPr>
+                          <m:e>
+                            <m:r>
+                              <a:rPr lang="de-DE" i="1">
+                                <a:solidFill>
+                                  <a:schemeClr val="bg1"/>
+                                </a:solidFill>
+                                <a:latin typeface="Cambria Math"/>
+                              </a:rPr>
+                              <m:t>𝑦</m:t>
+                            </m:r>
+                          </m:e>
+                          <m:sub>
+                            <m:r>
+                              <a:rPr lang="de-DE" i="1">
+                                <a:solidFill>
+                                  <a:schemeClr val="bg1"/>
+                                </a:solidFill>
+                                <a:latin typeface="Cambria Math"/>
+                              </a:rPr>
+                              <m:t>1</m:t>
+                            </m:r>
+                          </m:sub>
+                        </m:sSub>
+                        <m:r>
+                          <a:rPr lang="de-DE" i="1">
+                            <a:solidFill>
+                              <a:schemeClr val="bg1"/>
+                            </a:solidFill>
+                            <a:latin typeface="Cambria Math"/>
+                          </a:rPr>
+                          <m:t>)</m:t>
+                        </m:r>
+                      </m:oMath>
+                    </m:oMathPara>
+                  </a14:m>
+                  <a:endParaRPr lang="de-DE" dirty="0">
+                    <a:solidFill>
+                      <a:schemeClr val="bg1"/>
+                    </a:solidFill>
+                  </a:endParaRPr>
+                </a:p>
+              </p:txBody>
+            </p:sp>
+          </mc:Choice>
+          <mc:Fallback xmlns="">
+            <p:sp>
+              <p:nvSpPr>
+                <p:cNvPr id="6" name="Rechteck 5"/>
+                <p:cNvSpPr>
+                  <a:spLocks noRot="1" noChangeAspect="1" noMove="1" noResize="1" noEditPoints="1" noAdjustHandles="1" noChangeArrowheads="1" noChangeShapeType="1" noTextEdit="1"/>
+                </p:cNvSpPr>
+                <p:nvPr/>
+              </p:nvSpPr>
+              <p:spPr>
+                <a:xfrm>
+                  <a:off x="1478105" y="5035259"/>
+                  <a:ext cx="900887" cy="369332"/>
+                </a:xfrm>
+                <a:prstGeom prst="rect">
+                  <a:avLst/>
+                </a:prstGeom>
+                <a:blipFill rotWithShape="1">
+                  <a:blip r:embed="rId3"/>
+                  <a:stretch>
+                    <a:fillRect l="-1351" r="-2027" b="-11475"/>
+                  </a:stretch>
+                </a:blipFill>
+              </p:spPr>
+              <p:txBody>
+                <a:bodyPr/>
+                <a:lstStyle/>
+                <a:p>
+                  <a:r>
+                    <a:rPr lang="de-DE">
+                      <a:noFill/>
+                    </a:rPr>
+                    <a:t> </a:t>
+                  </a:r>
+                </a:p>
+              </p:txBody>
+            </p:sp>
+          </mc:Fallback>
+        </mc:AlternateContent>
+      </p:grpSp>
+      <p:grpSp>
+        <p:nvGrpSpPr>
+          <p:cNvPr id="22" name="Gruppieren 21"/>
+          <p:cNvGrpSpPr/>
+          <p:nvPr/>
+        </p:nvGrpSpPr>
+        <p:grpSpPr>
+          <a:xfrm>
+            <a:off x="6948264" y="1916832"/>
+            <a:ext cx="984437" cy="673215"/>
+            <a:chOff x="6948264" y="1916832"/>
+            <a:chExt cx="984437" cy="673215"/>
+          </a:xfrm>
+        </p:grpSpPr>
+        <p:sp>
+          <p:nvSpPr>
+            <p:cNvPr id="9" name="Multiplizieren 8"/>
+            <p:cNvSpPr/>
+            <p:nvPr/>
+          </p:nvSpPr>
+          <p:spPr>
+            <a:xfrm>
+              <a:off x="7198281" y="1916832"/>
+              <a:ext cx="432048" cy="456468"/>
+            </a:xfrm>
+            <a:prstGeom prst="mathMultiply">
+              <a:avLst>
+                <a:gd name="adj1" fmla="val 0"/>
+              </a:avLst>
+            </a:prstGeom>
+            <a:solidFill>
+              <a:srgbClr val="FFFF00"/>
+            </a:solidFill>
+            <a:ln>
+              <a:solidFill>
+                <a:srgbClr val="FFFF00"/>
+              </a:solidFill>
+            </a:ln>
+          </p:spPr>
+          <p:style>
+            <a:lnRef idx="2">
+              <a:schemeClr val="accent1">
+                <a:shade val="50000"/>
+              </a:schemeClr>
+            </a:lnRef>
+            <a:fillRef idx="1">
+              <a:schemeClr val="accent1"/>
+            </a:fillRef>
+            <a:effectRef idx="0">
+              <a:schemeClr val="accent1"/>
+            </a:effectRef>
+            <a:fontRef idx="minor">
+              <a:schemeClr val="lt1"/>
+            </a:fontRef>
+          </p:style>
+          <p:txBody>
+            <a:bodyPr rtlCol="0" anchor="ctr"/>
+            <a:lstStyle/>
+            <a:p>
+              <a:pPr algn="ctr"/>
+              <a:endParaRPr lang="de-DE"/>
+            </a:p>
+          </p:txBody>
+        </p:sp>
+        <mc:AlternateContent xmlns:mc="http://schemas.openxmlformats.org/markup-compatibility/2006" xmlns:a14="http://schemas.microsoft.com/office/drawing/2010/main">
+          <mc:Choice Requires="a14">
+            <p:sp>
+              <p:nvSpPr>
+                <p:cNvPr id="10" name="Rechteck 9"/>
+                <p:cNvSpPr/>
+                <p:nvPr/>
+              </p:nvSpPr>
+              <p:spPr>
+                <a:xfrm>
+                  <a:off x="6948264" y="2193143"/>
+                  <a:ext cx="984437" cy="396904"/>
+                </a:xfrm>
+                <a:prstGeom prst="rect">
+                  <a:avLst/>
+                </a:prstGeom>
+              </p:spPr>
+              <p:txBody>
+                <a:bodyPr wrap="none">
+                  <a:spAutoFit/>
+                </a:bodyPr>
+                <a:lstStyle/>
+                <a:p>
+                  <a:pPr/>
+                  <a14:m>
+                    <m:oMathPara xmlns:m="http://schemas.openxmlformats.org/officeDocument/2006/math">
+                      <m:oMathParaPr>
+                        <m:jc m:val="centerGroup"/>
+                      </m:oMathParaPr>
+                      <m:oMath xmlns:m="http://schemas.openxmlformats.org/officeDocument/2006/math">
+                        <m:r>
+                          <a:rPr lang="de-DE" i="1" smtClean="0">
+                            <a:solidFill>
+                              <a:schemeClr val="bg1"/>
+                            </a:solidFill>
+                            <a:latin typeface="Cambria Math"/>
+                          </a:rPr>
+                          <m:t>(</m:t>
+                        </m:r>
+                        <m:sSub>
+                          <m:sSubPr>
+                            <m:ctrlPr>
+                              <a:rPr lang="de-DE" i="1">
+                                <a:solidFill>
+                                  <a:schemeClr val="bg1"/>
+                                </a:solidFill>
+                                <a:latin typeface="Cambria Math"/>
+                              </a:rPr>
+                            </m:ctrlPr>
+                          </m:sSubPr>
+                          <m:e>
+                            <m:r>
+                              <a:rPr lang="de-DE" i="1">
+                                <a:solidFill>
+                                  <a:schemeClr val="bg1"/>
+                                </a:solidFill>
+                                <a:latin typeface="Cambria Math"/>
+                              </a:rPr>
+                              <m:t>𝑥</m:t>
+                            </m:r>
+                          </m:e>
+                          <m:sub>
+                            <m:r>
+                              <a:rPr lang="de-DE" b="0" i="1" smtClean="0">
+                                <a:solidFill>
+                                  <a:schemeClr val="bg1"/>
+                                </a:solidFill>
+                                <a:latin typeface="Cambria Math"/>
+                              </a:rPr>
+                              <m:t>2</m:t>
+                            </m:r>
+                          </m:sub>
+                        </m:sSub>
+                        <m:r>
+                          <a:rPr lang="de-DE" i="1">
+                            <a:solidFill>
+                              <a:schemeClr val="bg1"/>
+                            </a:solidFill>
+                            <a:latin typeface="Cambria Math"/>
+                          </a:rPr>
+                          <m:t>, </m:t>
+                        </m:r>
+                        <m:sSub>
+                          <m:sSubPr>
+                            <m:ctrlPr>
+                              <a:rPr lang="de-DE" i="1">
+                                <a:solidFill>
+                                  <a:schemeClr val="bg1"/>
+                                </a:solidFill>
+                                <a:latin typeface="Cambria Math"/>
+                              </a:rPr>
+                            </m:ctrlPr>
+                          </m:sSubPr>
+                          <m:e>
+                            <m:r>
+                              <a:rPr lang="de-DE" i="1">
+                                <a:solidFill>
+                                  <a:schemeClr val="bg1"/>
+                                </a:solidFill>
+                                <a:latin typeface="Cambria Math"/>
+                              </a:rPr>
+                              <m:t>𝑦</m:t>
+                            </m:r>
+                          </m:e>
+                          <m:sub>
+                            <m:r>
+                              <a:rPr lang="de-DE" b="0" i="1" smtClean="0">
+                                <a:solidFill>
+                                  <a:schemeClr val="bg1"/>
+                                </a:solidFill>
+                                <a:latin typeface="Cambria Math"/>
+                              </a:rPr>
+                              <m:t>2</m:t>
+                            </m:r>
+                          </m:sub>
+                        </m:sSub>
+                        <m:r>
+                          <a:rPr lang="de-DE" i="1">
+                            <a:solidFill>
+                              <a:schemeClr val="bg1"/>
+                            </a:solidFill>
+                            <a:latin typeface="Cambria Math"/>
+                          </a:rPr>
+                          <m:t>)</m:t>
+                        </m:r>
+                      </m:oMath>
+                    </m:oMathPara>
+                  </a14:m>
+                  <a:endParaRPr lang="de-DE" dirty="0">
+                    <a:solidFill>
+                      <a:schemeClr val="bg1"/>
+                    </a:solidFill>
+                  </a:endParaRPr>
+                </a:p>
+              </p:txBody>
+            </p:sp>
+          </mc:Choice>
+          <mc:Fallback xmlns="">
+            <p:sp>
+              <p:nvSpPr>
+                <p:cNvPr id="10" name="Rechteck 9"/>
+                <p:cNvSpPr>
+                  <a:spLocks noRot="1" noChangeAspect="1" noMove="1" noResize="1" noEditPoints="1" noAdjustHandles="1" noChangeArrowheads="1" noChangeShapeType="1" noTextEdit="1"/>
+                </p:cNvSpPr>
+                <p:nvPr/>
+              </p:nvSpPr>
+              <p:spPr>
+                <a:xfrm>
+                  <a:off x="6948264" y="2193143"/>
+                  <a:ext cx="984437" cy="396904"/>
+                </a:xfrm>
+                <a:prstGeom prst="rect">
+                  <a:avLst/>
+                </a:prstGeom>
+                <a:blipFill rotWithShape="1">
+                  <a:blip r:embed="rId4"/>
+                  <a:stretch>
+                    <a:fillRect b="-4615"/>
+                  </a:stretch>
+                </a:blipFill>
+              </p:spPr>
+              <p:txBody>
+                <a:bodyPr/>
+                <a:lstStyle/>
+                <a:p>
+                  <a:r>
+                    <a:rPr lang="de-DE">
+                      <a:noFill/>
+                    </a:rPr>
+                    <a:t> </a:t>
+                  </a:r>
+                </a:p>
+              </p:txBody>
+            </p:sp>
+          </mc:Fallback>
+        </mc:AlternateContent>
+      </p:grpSp>
+      <p:cxnSp>
+        <p:nvCxnSpPr>
+          <p:cNvPr id="12" name="Gerade Verbindung mit Pfeil 11"/>
+          <p:cNvCxnSpPr/>
+          <p:nvPr/>
+        </p:nvCxnSpPr>
+        <p:spPr>
+          <a:xfrm flipV="1">
+            <a:off x="2086239" y="2145066"/>
+            <a:ext cx="5222065" cy="2724096"/>
+          </a:xfrm>
+          <a:prstGeom prst="straightConnector1">
+            <a:avLst/>
+          </a:prstGeom>
+          <a:ln w="19050">
+            <a:solidFill>
+              <a:schemeClr val="bg1"/>
+            </a:solidFill>
+            <a:headEnd type="arrow"/>
+            <a:tailEnd type="arrow"/>
+          </a:ln>
+        </p:spPr>
+        <p:style>
+          <a:lnRef idx="1">
+            <a:schemeClr val="accent1"/>
+          </a:lnRef>
+          <a:fillRef idx="0">
+            <a:schemeClr val="accent1"/>
+          </a:fillRef>
+          <a:effectRef idx="0">
+            <a:schemeClr val="accent1"/>
+          </a:effectRef>
+          <a:fontRef idx="minor">
+            <a:schemeClr val="tx1"/>
+          </a:fontRef>
+        </p:style>
+      </p:cxnSp>
+      <mc:AlternateContent xmlns:mc="http://schemas.openxmlformats.org/markup-compatibility/2006" xmlns:a14="http://schemas.microsoft.com/office/drawing/2010/main">
+        <mc:Choice Requires="a14">
+          <p:sp>
+            <p:nvSpPr>
+              <p:cNvPr id="16" name="Rechteck 15"/>
+              <p:cNvSpPr/>
+              <p:nvPr/>
+            </p:nvSpPr>
+            <p:spPr>
+              <a:xfrm>
+                <a:off x="4492862" y="3530605"/>
+                <a:ext cx="508408" cy="369332"/>
+              </a:xfrm>
+              <a:prstGeom prst="rect">
+                <a:avLst/>
+              </a:prstGeom>
+            </p:spPr>
+            <p:txBody>
+              <a:bodyPr wrap="none">
+                <a:spAutoFit/>
+              </a:bodyPr>
+              <a:lstStyle/>
+              <a:p>
+                <a:pPr/>
+                <a14:m>
+                  <m:oMathPara xmlns:m="http://schemas.openxmlformats.org/officeDocument/2006/math">
+                    <m:oMathParaPr>
+                      <m:jc m:val="centerGroup"/>
+                    </m:oMathParaPr>
+                    <m:oMath xmlns:m="http://schemas.openxmlformats.org/officeDocument/2006/math">
+                      <m:sSub>
+                        <m:sSubPr>
+                          <m:ctrlPr>
+                            <a:rPr lang="de-DE" b="1" i="1" smtClean="0">
+                              <a:solidFill>
+                                <a:schemeClr val="bg1"/>
+                              </a:solidFill>
+                              <a:latin typeface="Cambria Math"/>
+                            </a:rPr>
+                          </m:ctrlPr>
+                        </m:sSubPr>
+                        <m:e>
+                          <m:r>
+                            <a:rPr lang="de-DE" b="1" i="1">
+                              <a:solidFill>
+                                <a:schemeClr val="bg1"/>
+                              </a:solidFill>
+                              <a:latin typeface="Cambria Math"/>
+                            </a:rPr>
+                            <m:t>𝒅</m:t>
+                          </m:r>
+                        </m:e>
+                        <m:sub>
+                          <m:r>
+                            <a:rPr lang="de-DE" b="1" i="1">
+                              <a:solidFill>
+                                <a:schemeClr val="bg1"/>
+                              </a:solidFill>
+                              <a:latin typeface="Cambria Math"/>
+                            </a:rPr>
+                            <m:t>𝑨</m:t>
+                          </m:r>
+                        </m:sub>
+                      </m:sSub>
+                    </m:oMath>
+                  </m:oMathPara>
+                </a14:m>
+                <a:endParaRPr lang="de-DE" b="1" dirty="0"/>
+              </a:p>
+            </p:txBody>
+          </p:sp>
+        </mc:Choice>
+        <mc:Fallback xmlns="">
+          <p:sp>
+            <p:nvSpPr>
+              <p:cNvPr id="16" name="Rechteck 15"/>
+              <p:cNvSpPr>
+                <a:spLocks noRot="1" noChangeAspect="1" noMove="1" noResize="1" noEditPoints="1" noAdjustHandles="1" noChangeArrowheads="1" noChangeShapeType="1" noTextEdit="1"/>
+              </p:cNvSpPr>
+              <p:nvPr/>
+            </p:nvSpPr>
+            <p:spPr>
+              <a:xfrm>
+                <a:off x="4492862" y="3530605"/>
+                <a:ext cx="508408" cy="369332"/>
+              </a:xfrm>
+              <a:prstGeom prst="rect">
+                <a:avLst/>
+              </a:prstGeom>
+              <a:blipFill rotWithShape="1">
+                <a:blip r:embed="rId5"/>
+                <a:stretch>
+                  <a:fillRect/>
+                </a:stretch>
+              </a:blipFill>
+            </p:spPr>
+            <p:txBody>
+              <a:bodyPr/>
+              <a:lstStyle/>
+              <a:p>
+                <a:r>
+                  <a:rPr lang="de-DE">
+                    <a:noFill/>
+                  </a:rPr>
+                  <a:t> </a:t>
+                </a:r>
+              </a:p>
+            </p:txBody>
+          </p:sp>
+        </mc:Fallback>
+      </mc:AlternateContent>
+      <p:cxnSp>
+        <p:nvCxnSpPr>
+          <p:cNvPr id="17" name="Gerade Verbindung mit Pfeil 16"/>
+          <p:cNvCxnSpPr/>
+          <p:nvPr/>
+        </p:nvCxnSpPr>
+        <p:spPr>
+          <a:xfrm flipV="1">
+            <a:off x="755576" y="5805264"/>
+            <a:ext cx="7750492" cy="36930"/>
+          </a:xfrm>
+          <a:prstGeom prst="straightConnector1">
+            <a:avLst/>
+          </a:prstGeom>
+          <a:ln w="19050">
+            <a:solidFill>
+              <a:schemeClr val="bg1"/>
+            </a:solidFill>
+            <a:headEnd type="arrow"/>
+            <a:tailEnd type="arrow"/>
+          </a:ln>
+        </p:spPr>
+        <p:style>
+          <a:lnRef idx="1">
+            <a:schemeClr val="accent1"/>
+          </a:lnRef>
+          <a:fillRef idx="0">
+            <a:schemeClr val="accent1"/>
+          </a:fillRef>
+          <a:effectRef idx="0">
+            <a:schemeClr val="accent1"/>
+          </a:effectRef>
+          <a:fontRef idx="minor">
+            <a:schemeClr val="tx1"/>
+          </a:fontRef>
+        </p:style>
+      </p:cxnSp>
+      <mc:AlternateContent xmlns:mc="http://schemas.openxmlformats.org/markup-compatibility/2006" xmlns:a14="http://schemas.microsoft.com/office/drawing/2010/main">
+        <mc:Choice Requires="a14">
+          <p:sp>
+            <p:nvSpPr>
+              <p:cNvPr id="19" name="Rechteck 18"/>
+              <p:cNvSpPr/>
+              <p:nvPr/>
+            </p:nvSpPr>
+            <p:spPr>
+              <a:xfrm>
+                <a:off x="4299540" y="5852163"/>
+                <a:ext cx="386644" cy="369332"/>
+              </a:xfrm>
+              <a:prstGeom prst="rect">
+                <a:avLst/>
+              </a:prstGeom>
+            </p:spPr>
+            <p:txBody>
+              <a:bodyPr wrap="none">
+                <a:spAutoFit/>
+              </a:bodyPr>
+              <a:lstStyle/>
+              <a:p>
+                <a:pPr/>
+                <a14:m>
+                  <m:oMathPara xmlns:m="http://schemas.openxmlformats.org/officeDocument/2006/math">
+                    <m:oMathParaPr>
+                      <m:jc m:val="centerGroup"/>
+                    </m:oMathParaPr>
+                    <m:oMath xmlns:m="http://schemas.openxmlformats.org/officeDocument/2006/math">
+                      <m:r>
+                        <a:rPr lang="de-DE" b="1" i="1" smtClean="0">
+                          <a:solidFill>
+                            <a:schemeClr val="bg1"/>
+                          </a:solidFill>
+                          <a:latin typeface="Cambria Math"/>
+                        </a:rPr>
+                        <m:t>𝒃</m:t>
+                      </m:r>
+                    </m:oMath>
+                  </m:oMathPara>
+                </a14:m>
+                <a:endParaRPr lang="de-DE" dirty="0"/>
+              </a:p>
+            </p:txBody>
+          </p:sp>
+        </mc:Choice>
+        <mc:Fallback xmlns="">
+          <p:sp>
+            <p:nvSpPr>
+              <p:cNvPr id="19" name="Rechteck 18"/>
+              <p:cNvSpPr>
+                <a:spLocks noRot="1" noChangeAspect="1" noMove="1" noResize="1" noEditPoints="1" noAdjustHandles="1" noChangeArrowheads="1" noChangeShapeType="1" noTextEdit="1"/>
+              </p:cNvSpPr>
+              <p:nvPr/>
+            </p:nvSpPr>
+            <p:spPr>
+              <a:xfrm>
+                <a:off x="4299540" y="5852163"/>
+                <a:ext cx="386644" cy="369332"/>
+              </a:xfrm>
+              <a:prstGeom prst="rect">
+                <a:avLst/>
+              </a:prstGeom>
+              <a:blipFill rotWithShape="1">
+                <a:blip r:embed="rId6"/>
+                <a:stretch>
+                  <a:fillRect/>
+                </a:stretch>
+              </a:blipFill>
+            </p:spPr>
+            <p:txBody>
+              <a:bodyPr/>
+              <a:lstStyle/>
+              <a:p>
+                <a:r>
+                  <a:rPr lang="de-DE">
+                    <a:noFill/>
+                  </a:rPr>
+                  <a:t> </a:t>
+                </a:r>
+              </a:p>
+            </p:txBody>
+          </p:sp>
+        </mc:Fallback>
+      </mc:AlternateContent>
+    </p:spTree>
+    <p:extLst>
+      <p:ext uri="{BB962C8B-B14F-4D97-AF65-F5344CB8AC3E}">
+        <p14:creationId xmlns:p14="http://schemas.microsoft.com/office/powerpoint/2010/main" val="693648129"/>
+      </p:ext>
+    </p:extLst>
+  </p:cSld>
+  <p:clrMapOvr>
+    <a:masterClrMapping/>
+  </p:clrMapOvr>
+</p:sld>
+</file>
+
+<file path=ppt/slides/slide11.xml><?xml version="1.0" encoding="utf-8"?>
+<p:sld xmlns:a="http://schemas.openxmlformats.org/drawingml/2006/main" xmlns:r="http://schemas.openxmlformats.org/officeDocument/2006/relationships" xmlns:p="http://schemas.openxmlformats.org/presentationml/2006/main">
+  <p:cSld>
+    <p:spTree>
+      <p:nvGrpSpPr>
+        <p:cNvPr id="1" name=""/>
+        <p:cNvGrpSpPr/>
+        <p:nvPr/>
+      </p:nvGrpSpPr>
+      <p:grpSpPr>
+        <a:xfrm>
+          <a:off x="0" y="0"/>
+          <a:ext cx="0" cy="0"/>
+          <a:chOff x="0" y="0"/>
+          <a:chExt cx="0" cy="0"/>
+        </a:xfrm>
+      </p:grpSpPr>
+      <p:pic>
+        <p:nvPicPr>
           <p:cNvPr id="4" name="Inhaltsplatzhalter 3"/>
           <p:cNvPicPr>
             <a:picLocks noGrp="1" noChangeAspect="1"/>
@@ -6720,6 +7534,358 @@
 </file>
 
 <file path=ppt/slides/slide4.xml><?xml version="1.0" encoding="utf-8"?>
+<p:sld xmlns:a="http://schemas.openxmlformats.org/drawingml/2006/main" xmlns:r="http://schemas.openxmlformats.org/officeDocument/2006/relationships" xmlns:p="http://schemas.openxmlformats.org/presentationml/2006/main">
+  <p:cSld>
+    <p:spTree>
+      <p:nvGrpSpPr>
+        <p:cNvPr id="1" name=""/>
+        <p:cNvGrpSpPr/>
+        <p:nvPr/>
+      </p:nvGrpSpPr>
+      <p:grpSpPr>
+        <a:xfrm>
+          <a:off x="0" y="0"/>
+          <a:ext cx="0" cy="0"/>
+          <a:chOff x="0" y="0"/>
+          <a:chExt cx="0" cy="0"/>
+        </a:xfrm>
+      </p:grpSpPr>
+      <p:grpSp>
+        <p:nvGrpSpPr>
+          <p:cNvPr id="18" name="Gruppieren 17"/>
+          <p:cNvGrpSpPr/>
+          <p:nvPr/>
+        </p:nvGrpSpPr>
+        <p:grpSpPr>
+          <a:xfrm>
+            <a:off x="966292" y="2966528"/>
+            <a:ext cx="5791924" cy="1606550"/>
+            <a:chOff x="966292" y="2966528"/>
+            <a:chExt cx="5791924" cy="1606550"/>
+          </a:xfrm>
+        </p:grpSpPr>
+        <p:grpSp>
+          <p:nvGrpSpPr>
+            <p:cNvPr id="12" name="Gruppieren 11"/>
+            <p:cNvGrpSpPr/>
+            <p:nvPr/>
+          </p:nvGrpSpPr>
+          <p:grpSpPr>
+            <a:xfrm>
+              <a:off x="966292" y="2979228"/>
+              <a:ext cx="2213610" cy="1581150"/>
+              <a:chOff x="1059549" y="2800668"/>
+              <a:chExt cx="2213610" cy="1581150"/>
+            </a:xfrm>
+          </p:grpSpPr>
+          <p:pic>
+            <p:nvPicPr>
+              <p:cNvPr id="6" name="Grafik 5"/>
+              <p:cNvPicPr/>
+              <p:nvPr/>
+            </p:nvPicPr>
+            <p:blipFill>
+              <a:blip r:embed="rId2" cstate="print">
+                <a:extLst>
+                  <a:ext uri="{28A0092B-C50C-407E-A947-70E740481C1C}">
+                    <a14:useLocalDpi xmlns:a14="http://schemas.microsoft.com/office/drawing/2010/main" val="0"/>
+                  </a:ext>
+                </a:extLst>
+              </a:blip>
+              <a:stretch>
+                <a:fillRect/>
+              </a:stretch>
+            </p:blipFill>
+            <p:spPr>
+              <a:xfrm>
+                <a:off x="1059549" y="2800668"/>
+                <a:ext cx="2213610" cy="1581150"/>
+              </a:xfrm>
+              <a:prstGeom prst="rect">
+                <a:avLst/>
+              </a:prstGeom>
+            </p:spPr>
+          </p:pic>
+          <p:cxnSp>
+            <p:nvCxnSpPr>
+              <p:cNvPr id="4" name="Lige forbindelse 23"/>
+              <p:cNvCxnSpPr/>
+              <p:nvPr/>
+            </p:nvCxnSpPr>
+            <p:spPr>
+              <a:xfrm>
+                <a:off x="1528043" y="2820671"/>
+                <a:ext cx="1362795" cy="1556067"/>
+              </a:xfrm>
+              <a:prstGeom prst="line">
+                <a:avLst/>
+              </a:prstGeom>
+            </p:spPr>
+            <p:style>
+              <a:lnRef idx="3">
+                <a:schemeClr val="accent2"/>
+              </a:lnRef>
+              <a:fillRef idx="0">
+                <a:schemeClr val="accent2"/>
+              </a:fillRef>
+              <a:effectRef idx="2">
+                <a:schemeClr val="accent2"/>
+              </a:effectRef>
+              <a:fontRef idx="minor">
+                <a:schemeClr val="tx1"/>
+              </a:fontRef>
+            </p:style>
+          </p:cxnSp>
+          <p:sp>
+            <p:nvSpPr>
+              <p:cNvPr id="5" name="Textfeld 2"/>
+              <p:cNvSpPr txBox="1">
+                <a:spLocks noChangeArrowheads="1"/>
+              </p:cNvSpPr>
+              <p:nvPr/>
+            </p:nvSpPr>
+            <p:spPr bwMode="auto">
+              <a:xfrm>
+                <a:off x="2471764" y="3517646"/>
+                <a:ext cx="796087" cy="325755"/>
+              </a:xfrm>
+              <a:prstGeom prst="rect">
+                <a:avLst/>
+              </a:prstGeom>
+              <a:noFill/>
+              <a:ln w="9525">
+                <a:noFill/>
+                <a:miter lim="800000"/>
+                <a:headEnd/>
+                <a:tailEnd/>
+              </a:ln>
+            </p:spPr>
+            <p:txBody>
+              <a:bodyPr rot="0" vert="horz" wrap="square" lIns="91440" tIns="45720" rIns="91440" bIns="45720" anchor="t" anchorCtr="0">
+                <a:noAutofit/>
+              </a:bodyPr>
+              <a:lstStyle/>
+              <a:p>
+                <a:pPr>
+                  <a:lnSpc>
+                    <a:spcPct val="115000"/>
+                  </a:lnSpc>
+                  <a:spcAft>
+                    <a:spcPts val="1000"/>
+                  </a:spcAft>
+                </a:pPr>
+                <a:r>
+                  <a:rPr lang="de-DE" sz="1100" dirty="0" err="1">
+                    <a:solidFill>
+                      <a:srgbClr val="FFFFFF"/>
+                    </a:solidFill>
+                    <a:latin typeface="Frutiger 45 Light"/>
+                    <a:ea typeface="Calibri"/>
+                    <a:cs typeface="Times New Roman"/>
+                  </a:rPr>
+                  <a:t>wrong</a:t>
+                </a:r>
+                <a:endParaRPr lang="de-DE" sz="1100" dirty="0">
+                  <a:solidFill>
+                    <a:srgbClr val="FFFFFF"/>
+                  </a:solidFill>
+                  <a:latin typeface="Frutiger 45 Light"/>
+                  <a:ea typeface="Calibri"/>
+                  <a:cs typeface="Times New Roman"/>
+                </a:endParaRPr>
+              </a:p>
+            </p:txBody>
+          </p:sp>
+        </p:grpSp>
+        <p:grpSp>
+          <p:nvGrpSpPr>
+            <p:cNvPr id="10" name="Gruppieren 9"/>
+            <p:cNvGrpSpPr/>
+            <p:nvPr/>
+          </p:nvGrpSpPr>
+          <p:grpSpPr>
+            <a:xfrm>
+              <a:off x="4516031" y="2966528"/>
+              <a:ext cx="2242185" cy="1606550"/>
+              <a:chOff x="3450908" y="2627948"/>
+              <a:chExt cx="2242185" cy="1606550"/>
+            </a:xfrm>
+          </p:grpSpPr>
+          <p:pic>
+            <p:nvPicPr>
+              <p:cNvPr id="7" name="Grafik 6"/>
+              <p:cNvPicPr/>
+              <p:nvPr/>
+            </p:nvPicPr>
+            <p:blipFill>
+              <a:blip r:embed="rId3" cstate="print">
+                <a:extLst>
+                  <a:ext uri="{28A0092B-C50C-407E-A947-70E740481C1C}">
+                    <a14:useLocalDpi xmlns:a14="http://schemas.microsoft.com/office/drawing/2010/main" val="0"/>
+                  </a:ext>
+                </a:extLst>
+              </a:blip>
+              <a:stretch>
+                <a:fillRect/>
+              </a:stretch>
+            </p:blipFill>
+            <p:spPr>
+              <a:xfrm>
+                <a:off x="3450908" y="2627948"/>
+                <a:ext cx="2242185" cy="1602105"/>
+              </a:xfrm>
+              <a:prstGeom prst="rect">
+                <a:avLst/>
+              </a:prstGeom>
+            </p:spPr>
+          </p:pic>
+          <p:sp>
+            <p:nvSpPr>
+              <p:cNvPr id="8" name="Textfeld 35"/>
+              <p:cNvSpPr txBox="1">
+                <a:spLocks noChangeArrowheads="1"/>
+              </p:cNvSpPr>
+              <p:nvPr/>
+            </p:nvSpPr>
+            <p:spPr bwMode="auto">
+              <a:xfrm>
+                <a:off x="4939348" y="3356992"/>
+                <a:ext cx="675640" cy="325755"/>
+              </a:xfrm>
+              <a:prstGeom prst="rect">
+                <a:avLst/>
+              </a:prstGeom>
+              <a:noFill/>
+              <a:ln w="9525">
+                <a:solidFill>
+                  <a:srgbClr val="000000"/>
+                </a:solidFill>
+                <a:miter lim="800000"/>
+                <a:headEnd/>
+                <a:tailEnd/>
+              </a:ln>
+            </p:spPr>
+            <p:txBody>
+              <a:bodyPr rot="0" vert="horz" wrap="square" lIns="91440" tIns="45720" rIns="91440" bIns="45720" anchor="t" anchorCtr="0">
+                <a:noAutofit/>
+              </a:bodyPr>
+              <a:lstStyle/>
+              <a:p>
+                <a:pPr>
+                  <a:lnSpc>
+                    <a:spcPct val="115000"/>
+                  </a:lnSpc>
+                  <a:spcAft>
+                    <a:spcPts val="1000"/>
+                  </a:spcAft>
+                </a:pPr>
+                <a:r>
+                  <a:rPr lang="de-DE" sz="1100" dirty="0">
+                    <a:solidFill>
+                      <a:srgbClr val="FFFFFF"/>
+                    </a:solidFill>
+                    <a:effectLst/>
+                    <a:latin typeface="Frutiger 45 Light"/>
+                    <a:ea typeface="Calibri"/>
+                    <a:cs typeface="Times New Roman"/>
+                  </a:rPr>
+                  <a:t>OK</a:t>
+                </a:r>
+                <a:endParaRPr lang="de-DE" sz="1100" dirty="0">
+                  <a:effectLst/>
+                  <a:latin typeface="Frutiger 45 Light"/>
+                  <a:ea typeface="Calibri"/>
+                  <a:cs typeface="Times New Roman"/>
+                </a:endParaRPr>
+              </a:p>
+            </p:txBody>
+          </p:sp>
+          <p:cxnSp>
+            <p:nvCxnSpPr>
+              <p:cNvPr id="9" name="Lige forbindelse 2"/>
+              <p:cNvCxnSpPr/>
+              <p:nvPr/>
+            </p:nvCxnSpPr>
+            <p:spPr>
+              <a:xfrm>
+                <a:off x="4656138" y="2630488"/>
+                <a:ext cx="0" cy="1604010"/>
+              </a:xfrm>
+              <a:prstGeom prst="line">
+                <a:avLst/>
+              </a:prstGeom>
+            </p:spPr>
+            <p:style>
+              <a:lnRef idx="3">
+                <a:schemeClr val="accent3"/>
+              </a:lnRef>
+              <a:fillRef idx="0">
+                <a:schemeClr val="accent3"/>
+              </a:fillRef>
+              <a:effectRef idx="2">
+                <a:schemeClr val="accent3"/>
+              </a:effectRef>
+              <a:fontRef idx="minor">
+                <a:schemeClr val="tx1"/>
+              </a:fontRef>
+            </p:style>
+          </p:cxnSp>
+        </p:grpSp>
+        <p:sp>
+          <p:nvSpPr>
+            <p:cNvPr id="17" name="Pfeil nach rechts 16"/>
+            <p:cNvSpPr/>
+            <p:nvPr/>
+          </p:nvSpPr>
+          <p:spPr>
+            <a:xfrm>
+              <a:off x="3523931" y="3687065"/>
+              <a:ext cx="648072" cy="165476"/>
+            </a:xfrm>
+            <a:prstGeom prst="rightArrow">
+              <a:avLst/>
+            </a:prstGeom>
+          </p:spPr>
+          <p:style>
+            <a:lnRef idx="2">
+              <a:schemeClr val="accent1">
+                <a:shade val="50000"/>
+              </a:schemeClr>
+            </a:lnRef>
+            <a:fillRef idx="1">
+              <a:schemeClr val="accent1"/>
+            </a:fillRef>
+            <a:effectRef idx="0">
+              <a:schemeClr val="accent1"/>
+            </a:effectRef>
+            <a:fontRef idx="minor">
+              <a:schemeClr val="lt1"/>
+            </a:fontRef>
+          </p:style>
+          <p:txBody>
+            <a:bodyPr rtlCol="0" anchor="ctr"/>
+            <a:lstStyle/>
+            <a:p>
+              <a:pPr algn="ctr"/>
+              <a:endParaRPr lang="de-DE"/>
+            </a:p>
+          </p:txBody>
+        </p:sp>
+      </p:grpSp>
+    </p:spTree>
+    <p:extLst>
+      <p:ext uri="{BB962C8B-B14F-4D97-AF65-F5344CB8AC3E}">
+        <p14:creationId xmlns:p14="http://schemas.microsoft.com/office/powerpoint/2010/main" val="753392814"/>
+      </p:ext>
+    </p:extLst>
+  </p:cSld>
+  <p:clrMapOvr>
+    <a:masterClrMapping/>
+  </p:clrMapOvr>
+</p:sld>
+</file>
+
+<file path=ppt/slides/slide5.xml><?xml version="1.0" encoding="utf-8"?>
 <p:sld xmlns:a="http://schemas.openxmlformats.org/drawingml/2006/main" xmlns:r="http://schemas.openxmlformats.org/officeDocument/2006/relationships" xmlns:p="http://schemas.openxmlformats.org/presentationml/2006/main">
   <p:cSld>
     <p:spTree>
@@ -7613,7 +8779,7 @@
 </p:sld>
 </file>
 
-<file path=ppt/slides/slide5.xml><?xml version="1.0" encoding="utf-8"?>
+<file path=ppt/slides/slide6.xml><?xml version="1.0" encoding="utf-8"?>
 <p:sld xmlns:a="http://schemas.openxmlformats.org/drawingml/2006/main" xmlns:r="http://schemas.openxmlformats.org/officeDocument/2006/relationships" xmlns:p="http://schemas.openxmlformats.org/presentationml/2006/main">
   <p:cSld>
     <p:spTree>
@@ -8276,7 +9442,7 @@
 </p:sld>
 </file>
 
-<file path=ppt/slides/slide6.xml><?xml version="1.0" encoding="utf-8"?>
+<file path=ppt/slides/slide7.xml><?xml version="1.0" encoding="utf-8"?>
 <p:sld xmlns:a="http://schemas.openxmlformats.org/drawingml/2006/main" xmlns:r="http://schemas.openxmlformats.org/officeDocument/2006/relationships" xmlns:p="http://schemas.openxmlformats.org/presentationml/2006/main">
   <p:cSld>
     <p:spTree>
@@ -11355,7 +12521,7 @@
 </p:sld>
 </file>
 
-<file path=ppt/slides/slide7.xml><?xml version="1.0" encoding="utf-8"?>
+<file path=ppt/slides/slide8.xml><?xml version="1.0" encoding="utf-8"?>
 <p:sld xmlns:a="http://schemas.openxmlformats.org/drawingml/2006/main" xmlns:r="http://schemas.openxmlformats.org/officeDocument/2006/relationships" xmlns:p="http://schemas.openxmlformats.org/presentationml/2006/main">
   <p:cSld>
     <p:spTree>
@@ -12211,7 +13377,7 @@
 </p:sld>
 </file>
 
-<file path=ppt/slides/slide8.xml><?xml version="1.0" encoding="utf-8"?>
+<file path=ppt/slides/slide9.xml><?xml version="1.0" encoding="utf-8"?>
 <p:sld xmlns:a="http://schemas.openxmlformats.org/drawingml/2006/main" xmlns:r="http://schemas.openxmlformats.org/officeDocument/2006/relationships" xmlns:p="http://schemas.openxmlformats.org/presentationml/2006/main">
   <p:cSld>
     <p:spTree>
@@ -13015,819 +14181,6 @@
     <p:extLst>
       <p:ext uri="{BB962C8B-B14F-4D97-AF65-F5344CB8AC3E}">
         <p14:creationId xmlns:p14="http://schemas.microsoft.com/office/powerpoint/2010/main" val="1261190278"/>
-      </p:ext>
-    </p:extLst>
-  </p:cSld>
-  <p:clrMapOvr>
-    <a:masterClrMapping/>
-  </p:clrMapOvr>
-</p:sld>
-</file>
-
-<file path=ppt/slides/slide9.xml><?xml version="1.0" encoding="utf-8"?>
-<p:sld xmlns:a="http://schemas.openxmlformats.org/drawingml/2006/main" xmlns:r="http://schemas.openxmlformats.org/officeDocument/2006/relationships" xmlns:p="http://schemas.openxmlformats.org/presentationml/2006/main">
-  <p:cSld>
-    <p:spTree>
-      <p:nvGrpSpPr>
-        <p:cNvPr id="1" name=""/>
-        <p:cNvGrpSpPr/>
-        <p:nvPr/>
-      </p:nvGrpSpPr>
-      <p:grpSpPr>
-        <a:xfrm>
-          <a:off x="0" y="0"/>
-          <a:ext cx="0" cy="0"/>
-          <a:chOff x="0" y="0"/>
-          <a:chExt cx="0" cy="0"/>
-        </a:xfrm>
-      </p:grpSpPr>
-      <p:pic>
-        <p:nvPicPr>
-          <p:cNvPr id="2" name="Grafik 1"/>
-          <p:cNvPicPr>
-            <a:picLocks noChangeAspect="1"/>
-          </p:cNvPicPr>
-          <p:nvPr/>
-        </p:nvPicPr>
-        <p:blipFill>
-          <a:blip r:embed="rId2">
-            <a:extLst>
-              <a:ext uri="{28A0092B-C50C-407E-A947-70E740481C1C}">
-                <a14:useLocalDpi xmlns:a14="http://schemas.microsoft.com/office/drawing/2010/main" val="0"/>
-              </a:ext>
-            </a:extLst>
-          </a:blip>
-          <a:stretch>
-            <a:fillRect/>
-          </a:stretch>
-        </p:blipFill>
-        <p:spPr>
-          <a:xfrm>
-            <a:off x="755576" y="564956"/>
-            <a:ext cx="7750492" cy="5816372"/>
-          </a:xfrm>
-          <a:prstGeom prst="rect">
-            <a:avLst/>
-          </a:prstGeom>
-        </p:spPr>
-      </p:pic>
-      <p:grpSp>
-        <p:nvGrpSpPr>
-          <p:cNvPr id="25" name="Gruppieren 24"/>
-          <p:cNvGrpSpPr/>
-          <p:nvPr/>
-        </p:nvGrpSpPr>
-        <p:grpSpPr>
-          <a:xfrm>
-            <a:off x="1478105" y="4776419"/>
-            <a:ext cx="900887" cy="628172"/>
-            <a:chOff x="1478105" y="4776419"/>
-            <a:chExt cx="900887" cy="628172"/>
-          </a:xfrm>
-        </p:grpSpPr>
-        <p:sp>
-          <p:nvSpPr>
-            <p:cNvPr id="5" name="Multiplizieren 4"/>
-            <p:cNvSpPr/>
-            <p:nvPr/>
-          </p:nvSpPr>
-          <p:spPr>
-            <a:xfrm>
-              <a:off x="1686958" y="4776419"/>
-              <a:ext cx="399281" cy="382781"/>
-            </a:xfrm>
-            <a:prstGeom prst="mathMultiply">
-              <a:avLst>
-                <a:gd name="adj1" fmla="val 0"/>
-              </a:avLst>
-            </a:prstGeom>
-            <a:solidFill>
-              <a:srgbClr val="FFFF00"/>
-            </a:solidFill>
-            <a:ln>
-              <a:solidFill>
-                <a:srgbClr val="FFFF00"/>
-              </a:solidFill>
-            </a:ln>
-          </p:spPr>
-          <p:style>
-            <a:lnRef idx="2">
-              <a:schemeClr val="accent1">
-                <a:shade val="50000"/>
-              </a:schemeClr>
-            </a:lnRef>
-            <a:fillRef idx="1">
-              <a:schemeClr val="accent1"/>
-            </a:fillRef>
-            <a:effectRef idx="0">
-              <a:schemeClr val="accent1"/>
-            </a:effectRef>
-            <a:fontRef idx="minor">
-              <a:schemeClr val="lt1"/>
-            </a:fontRef>
-          </p:style>
-          <p:txBody>
-            <a:bodyPr rtlCol="0" anchor="ctr"/>
-            <a:lstStyle/>
-            <a:p>
-              <a:pPr algn="ctr"/>
-              <a:endParaRPr lang="de-DE"/>
-            </a:p>
-          </p:txBody>
-        </p:sp>
-        <mc:AlternateContent xmlns:mc="http://schemas.openxmlformats.org/markup-compatibility/2006" xmlns:a14="http://schemas.microsoft.com/office/drawing/2010/main">
-          <mc:Choice Requires="a14">
-            <p:sp>
-              <p:nvSpPr>
-                <p:cNvPr id="6" name="Rechteck 5"/>
-                <p:cNvSpPr/>
-                <p:nvPr/>
-              </p:nvSpPr>
-              <p:spPr>
-                <a:xfrm>
-                  <a:off x="1478105" y="5035259"/>
-                  <a:ext cx="900887" cy="369332"/>
-                </a:xfrm>
-                <a:prstGeom prst="rect">
-                  <a:avLst/>
-                </a:prstGeom>
-              </p:spPr>
-              <p:txBody>
-                <a:bodyPr wrap="square">
-                  <a:spAutoFit/>
-                </a:bodyPr>
-                <a:lstStyle/>
-                <a:p>
-                  <a:pPr/>
-                  <a14:m>
-                    <m:oMathPara xmlns:m="http://schemas.openxmlformats.org/officeDocument/2006/math">
-                      <m:oMathParaPr>
-                        <m:jc m:val="centerGroup"/>
-                      </m:oMathParaPr>
-                      <m:oMath xmlns:m="http://schemas.openxmlformats.org/officeDocument/2006/math">
-                        <m:r>
-                          <a:rPr lang="de-DE" i="1" smtClean="0">
-                            <a:solidFill>
-                              <a:schemeClr val="bg1"/>
-                            </a:solidFill>
-                            <a:latin typeface="Cambria Math"/>
-                          </a:rPr>
-                          <m:t>(</m:t>
-                        </m:r>
-                        <m:sSub>
-                          <m:sSubPr>
-                            <m:ctrlPr>
-                              <a:rPr lang="de-DE" i="1">
-                                <a:solidFill>
-                                  <a:schemeClr val="bg1"/>
-                                </a:solidFill>
-                                <a:latin typeface="Cambria Math"/>
-                              </a:rPr>
-                            </m:ctrlPr>
-                          </m:sSubPr>
-                          <m:e>
-                            <m:r>
-                              <a:rPr lang="de-DE" i="1">
-                                <a:solidFill>
-                                  <a:schemeClr val="bg1"/>
-                                </a:solidFill>
-                                <a:latin typeface="Cambria Math"/>
-                              </a:rPr>
-                              <m:t>𝑥</m:t>
-                            </m:r>
-                          </m:e>
-                          <m:sub>
-                            <m:r>
-                              <a:rPr lang="de-DE" i="1">
-                                <a:solidFill>
-                                  <a:schemeClr val="bg1"/>
-                                </a:solidFill>
-                                <a:latin typeface="Cambria Math"/>
-                              </a:rPr>
-                              <m:t>1</m:t>
-                            </m:r>
-                          </m:sub>
-                        </m:sSub>
-                        <m:r>
-                          <a:rPr lang="de-DE" i="1">
-                            <a:solidFill>
-                              <a:schemeClr val="bg1"/>
-                            </a:solidFill>
-                            <a:latin typeface="Cambria Math"/>
-                          </a:rPr>
-                          <m:t>, </m:t>
-                        </m:r>
-                        <m:sSub>
-                          <m:sSubPr>
-                            <m:ctrlPr>
-                              <a:rPr lang="de-DE" i="1">
-                                <a:solidFill>
-                                  <a:schemeClr val="bg1"/>
-                                </a:solidFill>
-                                <a:latin typeface="Cambria Math"/>
-                              </a:rPr>
-                            </m:ctrlPr>
-                          </m:sSubPr>
-                          <m:e>
-                            <m:r>
-                              <a:rPr lang="de-DE" i="1">
-                                <a:solidFill>
-                                  <a:schemeClr val="bg1"/>
-                                </a:solidFill>
-                                <a:latin typeface="Cambria Math"/>
-                              </a:rPr>
-                              <m:t>𝑦</m:t>
-                            </m:r>
-                          </m:e>
-                          <m:sub>
-                            <m:r>
-                              <a:rPr lang="de-DE" i="1">
-                                <a:solidFill>
-                                  <a:schemeClr val="bg1"/>
-                                </a:solidFill>
-                                <a:latin typeface="Cambria Math"/>
-                              </a:rPr>
-                              <m:t>1</m:t>
-                            </m:r>
-                          </m:sub>
-                        </m:sSub>
-                        <m:r>
-                          <a:rPr lang="de-DE" i="1">
-                            <a:solidFill>
-                              <a:schemeClr val="bg1"/>
-                            </a:solidFill>
-                            <a:latin typeface="Cambria Math"/>
-                          </a:rPr>
-                          <m:t>)</m:t>
-                        </m:r>
-                      </m:oMath>
-                    </m:oMathPara>
-                  </a14:m>
-                  <a:endParaRPr lang="de-DE" dirty="0">
-                    <a:solidFill>
-                      <a:schemeClr val="bg1"/>
-                    </a:solidFill>
-                  </a:endParaRPr>
-                </a:p>
-              </p:txBody>
-            </p:sp>
-          </mc:Choice>
-          <mc:Fallback xmlns="">
-            <p:sp>
-              <p:nvSpPr>
-                <p:cNvPr id="6" name="Rechteck 5"/>
-                <p:cNvSpPr>
-                  <a:spLocks noRot="1" noChangeAspect="1" noMove="1" noResize="1" noEditPoints="1" noAdjustHandles="1" noChangeArrowheads="1" noChangeShapeType="1" noTextEdit="1"/>
-                </p:cNvSpPr>
-                <p:nvPr/>
-              </p:nvSpPr>
-              <p:spPr>
-                <a:xfrm>
-                  <a:off x="1478105" y="5035259"/>
-                  <a:ext cx="900887" cy="369332"/>
-                </a:xfrm>
-                <a:prstGeom prst="rect">
-                  <a:avLst/>
-                </a:prstGeom>
-                <a:blipFill rotWithShape="1">
-                  <a:blip r:embed="rId3"/>
-                  <a:stretch>
-                    <a:fillRect l="-1351" r="-2027" b="-11475"/>
-                  </a:stretch>
-                </a:blipFill>
-              </p:spPr>
-              <p:txBody>
-                <a:bodyPr/>
-                <a:lstStyle/>
-                <a:p>
-                  <a:r>
-                    <a:rPr lang="de-DE">
-                      <a:noFill/>
-                    </a:rPr>
-                    <a:t> </a:t>
-                  </a:r>
-                </a:p>
-              </p:txBody>
-            </p:sp>
-          </mc:Fallback>
-        </mc:AlternateContent>
-      </p:grpSp>
-      <p:grpSp>
-        <p:nvGrpSpPr>
-          <p:cNvPr id="22" name="Gruppieren 21"/>
-          <p:cNvGrpSpPr/>
-          <p:nvPr/>
-        </p:nvGrpSpPr>
-        <p:grpSpPr>
-          <a:xfrm>
-            <a:off x="6948264" y="1916832"/>
-            <a:ext cx="984437" cy="673215"/>
-            <a:chOff x="6948264" y="1916832"/>
-            <a:chExt cx="984437" cy="673215"/>
-          </a:xfrm>
-        </p:grpSpPr>
-        <p:sp>
-          <p:nvSpPr>
-            <p:cNvPr id="9" name="Multiplizieren 8"/>
-            <p:cNvSpPr/>
-            <p:nvPr/>
-          </p:nvSpPr>
-          <p:spPr>
-            <a:xfrm>
-              <a:off x="7198281" y="1916832"/>
-              <a:ext cx="432048" cy="456468"/>
-            </a:xfrm>
-            <a:prstGeom prst="mathMultiply">
-              <a:avLst>
-                <a:gd name="adj1" fmla="val 0"/>
-              </a:avLst>
-            </a:prstGeom>
-            <a:solidFill>
-              <a:srgbClr val="FFFF00"/>
-            </a:solidFill>
-            <a:ln>
-              <a:solidFill>
-                <a:srgbClr val="FFFF00"/>
-              </a:solidFill>
-            </a:ln>
-          </p:spPr>
-          <p:style>
-            <a:lnRef idx="2">
-              <a:schemeClr val="accent1">
-                <a:shade val="50000"/>
-              </a:schemeClr>
-            </a:lnRef>
-            <a:fillRef idx="1">
-              <a:schemeClr val="accent1"/>
-            </a:fillRef>
-            <a:effectRef idx="0">
-              <a:schemeClr val="accent1"/>
-            </a:effectRef>
-            <a:fontRef idx="minor">
-              <a:schemeClr val="lt1"/>
-            </a:fontRef>
-          </p:style>
-          <p:txBody>
-            <a:bodyPr rtlCol="0" anchor="ctr"/>
-            <a:lstStyle/>
-            <a:p>
-              <a:pPr algn="ctr"/>
-              <a:endParaRPr lang="de-DE"/>
-            </a:p>
-          </p:txBody>
-        </p:sp>
-        <mc:AlternateContent xmlns:mc="http://schemas.openxmlformats.org/markup-compatibility/2006" xmlns:a14="http://schemas.microsoft.com/office/drawing/2010/main">
-          <mc:Choice Requires="a14">
-            <p:sp>
-              <p:nvSpPr>
-                <p:cNvPr id="10" name="Rechteck 9"/>
-                <p:cNvSpPr/>
-                <p:nvPr/>
-              </p:nvSpPr>
-              <p:spPr>
-                <a:xfrm>
-                  <a:off x="6948264" y="2193143"/>
-                  <a:ext cx="984437" cy="396904"/>
-                </a:xfrm>
-                <a:prstGeom prst="rect">
-                  <a:avLst/>
-                </a:prstGeom>
-              </p:spPr>
-              <p:txBody>
-                <a:bodyPr wrap="none">
-                  <a:spAutoFit/>
-                </a:bodyPr>
-                <a:lstStyle/>
-                <a:p>
-                  <a:pPr/>
-                  <a14:m>
-                    <m:oMathPara xmlns:m="http://schemas.openxmlformats.org/officeDocument/2006/math">
-                      <m:oMathParaPr>
-                        <m:jc m:val="centerGroup"/>
-                      </m:oMathParaPr>
-                      <m:oMath xmlns:m="http://schemas.openxmlformats.org/officeDocument/2006/math">
-                        <m:r>
-                          <a:rPr lang="de-DE" i="1" smtClean="0">
-                            <a:solidFill>
-                              <a:schemeClr val="bg1"/>
-                            </a:solidFill>
-                            <a:latin typeface="Cambria Math"/>
-                          </a:rPr>
-                          <m:t>(</m:t>
-                        </m:r>
-                        <m:sSub>
-                          <m:sSubPr>
-                            <m:ctrlPr>
-                              <a:rPr lang="de-DE" i="1">
-                                <a:solidFill>
-                                  <a:schemeClr val="bg1"/>
-                                </a:solidFill>
-                                <a:latin typeface="Cambria Math"/>
-                              </a:rPr>
-                            </m:ctrlPr>
-                          </m:sSubPr>
-                          <m:e>
-                            <m:r>
-                              <a:rPr lang="de-DE" i="1">
-                                <a:solidFill>
-                                  <a:schemeClr val="bg1"/>
-                                </a:solidFill>
-                                <a:latin typeface="Cambria Math"/>
-                              </a:rPr>
-                              <m:t>𝑥</m:t>
-                            </m:r>
-                          </m:e>
-                          <m:sub>
-                            <m:r>
-                              <a:rPr lang="de-DE" b="0" i="1" smtClean="0">
-                                <a:solidFill>
-                                  <a:schemeClr val="bg1"/>
-                                </a:solidFill>
-                                <a:latin typeface="Cambria Math"/>
-                              </a:rPr>
-                              <m:t>2</m:t>
-                            </m:r>
-                          </m:sub>
-                        </m:sSub>
-                        <m:r>
-                          <a:rPr lang="de-DE" i="1">
-                            <a:solidFill>
-                              <a:schemeClr val="bg1"/>
-                            </a:solidFill>
-                            <a:latin typeface="Cambria Math"/>
-                          </a:rPr>
-                          <m:t>, </m:t>
-                        </m:r>
-                        <m:sSub>
-                          <m:sSubPr>
-                            <m:ctrlPr>
-                              <a:rPr lang="de-DE" i="1">
-                                <a:solidFill>
-                                  <a:schemeClr val="bg1"/>
-                                </a:solidFill>
-                                <a:latin typeface="Cambria Math"/>
-                              </a:rPr>
-                            </m:ctrlPr>
-                          </m:sSubPr>
-                          <m:e>
-                            <m:r>
-                              <a:rPr lang="de-DE" i="1">
-                                <a:solidFill>
-                                  <a:schemeClr val="bg1"/>
-                                </a:solidFill>
-                                <a:latin typeface="Cambria Math"/>
-                              </a:rPr>
-                              <m:t>𝑦</m:t>
-                            </m:r>
-                          </m:e>
-                          <m:sub>
-                            <m:r>
-                              <a:rPr lang="de-DE" b="0" i="1" smtClean="0">
-                                <a:solidFill>
-                                  <a:schemeClr val="bg1"/>
-                                </a:solidFill>
-                                <a:latin typeface="Cambria Math"/>
-                              </a:rPr>
-                              <m:t>2</m:t>
-                            </m:r>
-                          </m:sub>
-                        </m:sSub>
-                        <m:r>
-                          <a:rPr lang="de-DE" i="1">
-                            <a:solidFill>
-                              <a:schemeClr val="bg1"/>
-                            </a:solidFill>
-                            <a:latin typeface="Cambria Math"/>
-                          </a:rPr>
-                          <m:t>)</m:t>
-                        </m:r>
-                      </m:oMath>
-                    </m:oMathPara>
-                  </a14:m>
-                  <a:endParaRPr lang="de-DE" dirty="0">
-                    <a:solidFill>
-                      <a:schemeClr val="bg1"/>
-                    </a:solidFill>
-                  </a:endParaRPr>
-                </a:p>
-              </p:txBody>
-            </p:sp>
-          </mc:Choice>
-          <mc:Fallback xmlns="">
-            <p:sp>
-              <p:nvSpPr>
-                <p:cNvPr id="10" name="Rechteck 9"/>
-                <p:cNvSpPr>
-                  <a:spLocks noRot="1" noChangeAspect="1" noMove="1" noResize="1" noEditPoints="1" noAdjustHandles="1" noChangeArrowheads="1" noChangeShapeType="1" noTextEdit="1"/>
-                </p:cNvSpPr>
-                <p:nvPr/>
-              </p:nvSpPr>
-              <p:spPr>
-                <a:xfrm>
-                  <a:off x="6948264" y="2193143"/>
-                  <a:ext cx="984437" cy="396904"/>
-                </a:xfrm>
-                <a:prstGeom prst="rect">
-                  <a:avLst/>
-                </a:prstGeom>
-                <a:blipFill rotWithShape="1">
-                  <a:blip r:embed="rId4"/>
-                  <a:stretch>
-                    <a:fillRect b="-4615"/>
-                  </a:stretch>
-                </a:blipFill>
-              </p:spPr>
-              <p:txBody>
-                <a:bodyPr/>
-                <a:lstStyle/>
-                <a:p>
-                  <a:r>
-                    <a:rPr lang="de-DE">
-                      <a:noFill/>
-                    </a:rPr>
-                    <a:t> </a:t>
-                  </a:r>
-                </a:p>
-              </p:txBody>
-            </p:sp>
-          </mc:Fallback>
-        </mc:AlternateContent>
-      </p:grpSp>
-      <p:cxnSp>
-        <p:nvCxnSpPr>
-          <p:cNvPr id="12" name="Gerade Verbindung mit Pfeil 11"/>
-          <p:cNvCxnSpPr/>
-          <p:nvPr/>
-        </p:nvCxnSpPr>
-        <p:spPr>
-          <a:xfrm flipV="1">
-            <a:off x="2086239" y="2145066"/>
-            <a:ext cx="5222065" cy="2724096"/>
-          </a:xfrm>
-          <a:prstGeom prst="straightConnector1">
-            <a:avLst/>
-          </a:prstGeom>
-          <a:ln w="19050">
-            <a:solidFill>
-              <a:schemeClr val="bg1"/>
-            </a:solidFill>
-            <a:headEnd type="arrow"/>
-            <a:tailEnd type="arrow"/>
-          </a:ln>
-        </p:spPr>
-        <p:style>
-          <a:lnRef idx="1">
-            <a:schemeClr val="accent1"/>
-          </a:lnRef>
-          <a:fillRef idx="0">
-            <a:schemeClr val="accent1"/>
-          </a:fillRef>
-          <a:effectRef idx="0">
-            <a:schemeClr val="accent1"/>
-          </a:effectRef>
-          <a:fontRef idx="minor">
-            <a:schemeClr val="tx1"/>
-          </a:fontRef>
-        </p:style>
-      </p:cxnSp>
-      <mc:AlternateContent xmlns:mc="http://schemas.openxmlformats.org/markup-compatibility/2006" xmlns:a14="http://schemas.microsoft.com/office/drawing/2010/main">
-        <mc:Choice Requires="a14">
-          <p:sp>
-            <p:nvSpPr>
-              <p:cNvPr id="16" name="Rechteck 15"/>
-              <p:cNvSpPr/>
-              <p:nvPr/>
-            </p:nvSpPr>
-            <p:spPr>
-              <a:xfrm>
-                <a:off x="4492862" y="3530605"/>
-                <a:ext cx="508408" cy="369332"/>
-              </a:xfrm>
-              <a:prstGeom prst="rect">
-                <a:avLst/>
-              </a:prstGeom>
-            </p:spPr>
-            <p:txBody>
-              <a:bodyPr wrap="none">
-                <a:spAutoFit/>
-              </a:bodyPr>
-              <a:lstStyle/>
-              <a:p>
-                <a:pPr/>
-                <a14:m>
-                  <m:oMathPara xmlns:m="http://schemas.openxmlformats.org/officeDocument/2006/math">
-                    <m:oMathParaPr>
-                      <m:jc m:val="centerGroup"/>
-                    </m:oMathParaPr>
-                    <m:oMath xmlns:m="http://schemas.openxmlformats.org/officeDocument/2006/math">
-                      <m:sSub>
-                        <m:sSubPr>
-                          <m:ctrlPr>
-                            <a:rPr lang="de-DE" b="1" i="1" smtClean="0">
-                              <a:solidFill>
-                                <a:schemeClr val="bg1"/>
-                              </a:solidFill>
-                              <a:latin typeface="Cambria Math"/>
-                            </a:rPr>
-                          </m:ctrlPr>
-                        </m:sSubPr>
-                        <m:e>
-                          <m:r>
-                            <a:rPr lang="de-DE" b="1" i="1">
-                              <a:solidFill>
-                                <a:schemeClr val="bg1"/>
-                              </a:solidFill>
-                              <a:latin typeface="Cambria Math"/>
-                            </a:rPr>
-                            <m:t>𝒅</m:t>
-                          </m:r>
-                        </m:e>
-                        <m:sub>
-                          <m:r>
-                            <a:rPr lang="de-DE" b="1" i="1">
-                              <a:solidFill>
-                                <a:schemeClr val="bg1"/>
-                              </a:solidFill>
-                              <a:latin typeface="Cambria Math"/>
-                            </a:rPr>
-                            <m:t>𝑨</m:t>
-                          </m:r>
-                        </m:sub>
-                      </m:sSub>
-                    </m:oMath>
-                  </m:oMathPara>
-                </a14:m>
-                <a:endParaRPr lang="de-DE" b="1" dirty="0"/>
-              </a:p>
-            </p:txBody>
-          </p:sp>
-        </mc:Choice>
-        <mc:Fallback xmlns="">
-          <p:sp>
-            <p:nvSpPr>
-              <p:cNvPr id="16" name="Rechteck 15"/>
-              <p:cNvSpPr>
-                <a:spLocks noRot="1" noChangeAspect="1" noMove="1" noResize="1" noEditPoints="1" noAdjustHandles="1" noChangeArrowheads="1" noChangeShapeType="1" noTextEdit="1"/>
-              </p:cNvSpPr>
-              <p:nvPr/>
-            </p:nvSpPr>
-            <p:spPr>
-              <a:xfrm>
-                <a:off x="4492862" y="3530605"/>
-                <a:ext cx="508408" cy="369332"/>
-              </a:xfrm>
-              <a:prstGeom prst="rect">
-                <a:avLst/>
-              </a:prstGeom>
-              <a:blipFill rotWithShape="1">
-                <a:blip r:embed="rId5"/>
-                <a:stretch>
-                  <a:fillRect/>
-                </a:stretch>
-              </a:blipFill>
-            </p:spPr>
-            <p:txBody>
-              <a:bodyPr/>
-              <a:lstStyle/>
-              <a:p>
-                <a:r>
-                  <a:rPr lang="de-DE">
-                    <a:noFill/>
-                  </a:rPr>
-                  <a:t> </a:t>
-                </a:r>
-              </a:p>
-            </p:txBody>
-          </p:sp>
-        </mc:Fallback>
-      </mc:AlternateContent>
-      <p:cxnSp>
-        <p:nvCxnSpPr>
-          <p:cNvPr id="17" name="Gerade Verbindung mit Pfeil 16"/>
-          <p:cNvCxnSpPr/>
-          <p:nvPr/>
-        </p:nvCxnSpPr>
-        <p:spPr>
-          <a:xfrm flipV="1">
-            <a:off x="755576" y="5805264"/>
-            <a:ext cx="7750492" cy="36930"/>
-          </a:xfrm>
-          <a:prstGeom prst="straightConnector1">
-            <a:avLst/>
-          </a:prstGeom>
-          <a:ln w="19050">
-            <a:solidFill>
-              <a:schemeClr val="bg1"/>
-            </a:solidFill>
-            <a:headEnd type="arrow"/>
-            <a:tailEnd type="arrow"/>
-          </a:ln>
-        </p:spPr>
-        <p:style>
-          <a:lnRef idx="1">
-            <a:schemeClr val="accent1"/>
-          </a:lnRef>
-          <a:fillRef idx="0">
-            <a:schemeClr val="accent1"/>
-          </a:fillRef>
-          <a:effectRef idx="0">
-            <a:schemeClr val="accent1"/>
-          </a:effectRef>
-          <a:fontRef idx="minor">
-            <a:schemeClr val="tx1"/>
-          </a:fontRef>
-        </p:style>
-      </p:cxnSp>
-      <mc:AlternateContent xmlns:mc="http://schemas.openxmlformats.org/markup-compatibility/2006" xmlns:a14="http://schemas.microsoft.com/office/drawing/2010/main">
-        <mc:Choice Requires="a14">
-          <p:sp>
-            <p:nvSpPr>
-              <p:cNvPr id="19" name="Rechteck 18"/>
-              <p:cNvSpPr/>
-              <p:nvPr/>
-            </p:nvSpPr>
-            <p:spPr>
-              <a:xfrm>
-                <a:off x="4299540" y="5852163"/>
-                <a:ext cx="386644" cy="369332"/>
-              </a:xfrm>
-              <a:prstGeom prst="rect">
-                <a:avLst/>
-              </a:prstGeom>
-            </p:spPr>
-            <p:txBody>
-              <a:bodyPr wrap="none">
-                <a:spAutoFit/>
-              </a:bodyPr>
-              <a:lstStyle/>
-              <a:p>
-                <a:pPr/>
-                <a14:m>
-                  <m:oMathPara xmlns:m="http://schemas.openxmlformats.org/officeDocument/2006/math">
-                    <m:oMathParaPr>
-                      <m:jc m:val="centerGroup"/>
-                    </m:oMathParaPr>
-                    <m:oMath xmlns:m="http://schemas.openxmlformats.org/officeDocument/2006/math">
-                      <m:r>
-                        <a:rPr lang="de-DE" b="1" i="1" smtClean="0">
-                          <a:solidFill>
-                            <a:schemeClr val="bg1"/>
-                          </a:solidFill>
-                          <a:latin typeface="Cambria Math"/>
-                        </a:rPr>
-                        <m:t>𝒃</m:t>
-                      </m:r>
-                    </m:oMath>
-                  </m:oMathPara>
-                </a14:m>
-                <a:endParaRPr lang="de-DE" dirty="0"/>
-              </a:p>
-            </p:txBody>
-          </p:sp>
-        </mc:Choice>
-        <mc:Fallback xmlns="">
-          <p:sp>
-            <p:nvSpPr>
-              <p:cNvPr id="19" name="Rechteck 18"/>
-              <p:cNvSpPr>
-                <a:spLocks noRot="1" noChangeAspect="1" noMove="1" noResize="1" noEditPoints="1" noAdjustHandles="1" noChangeArrowheads="1" noChangeShapeType="1" noTextEdit="1"/>
-              </p:cNvSpPr>
-              <p:nvPr/>
-            </p:nvSpPr>
-            <p:spPr>
-              <a:xfrm>
-                <a:off x="4299540" y="5852163"/>
-                <a:ext cx="386644" cy="369332"/>
-              </a:xfrm>
-              <a:prstGeom prst="rect">
-                <a:avLst/>
-              </a:prstGeom>
-              <a:blipFill rotWithShape="1">
-                <a:blip r:embed="rId6"/>
-                <a:stretch>
-                  <a:fillRect/>
-                </a:stretch>
-              </a:blipFill>
-            </p:spPr>
-            <p:txBody>
-              <a:bodyPr/>
-              <a:lstStyle/>
-              <a:p>
-                <a:r>
-                  <a:rPr lang="de-DE">
-                    <a:noFill/>
-                  </a:rPr>
-                  <a:t> </a:t>
-                </a:r>
-              </a:p>
-            </p:txBody>
-          </p:sp>
-        </mc:Fallback>
-      </mc:AlternateContent>
-    </p:spTree>
-    <p:extLst>
-      <p:ext uri="{BB962C8B-B14F-4D97-AF65-F5344CB8AC3E}">
-        <p14:creationId xmlns:p14="http://schemas.microsoft.com/office/powerpoint/2010/main" val="693648129"/>
       </p:ext>
     </p:extLst>
   </p:cSld>

</xml_diff>